<commit_message>
updated slides with agenda
</commit_message>
<xml_diff>
--- a/slides/GED_Python_Workgroup_2018_01_23.pptx
+++ b/slides/GED_Python_Workgroup_2018_01_23.pptx
@@ -255,7 +255,7 @@
           <a:p>
             <a:fld id="{008BD8B9-5B15-4C0C-9B4A-FA7DA058E908}" type="datetimeFigureOut">
               <a:rPr lang="en-US" smtClean="0"/>
-              <a:t>1/4/2018</a:t>
+              <a:t>1/11/2018</a:t>
             </a:fld>
             <a:endParaRPr lang="en-US"/>
           </a:p>
@@ -423,7 +423,7 @@
           <a:p>
             <a:fld id="{008BD8B9-5B15-4C0C-9B4A-FA7DA058E908}" type="datetimeFigureOut">
               <a:rPr lang="en-US" smtClean="0"/>
-              <a:t>1/4/2018</a:t>
+              <a:t>1/11/2018</a:t>
             </a:fld>
             <a:endParaRPr lang="en-US"/>
           </a:p>
@@ -601,7 +601,7 @@
           <a:p>
             <a:fld id="{008BD8B9-5B15-4C0C-9B4A-FA7DA058E908}" type="datetimeFigureOut">
               <a:rPr lang="en-US" smtClean="0"/>
-              <a:t>1/4/2018</a:t>
+              <a:t>1/11/2018</a:t>
             </a:fld>
             <a:endParaRPr lang="en-US"/>
           </a:p>
@@ -769,7 +769,7 @@
           <a:p>
             <a:fld id="{008BD8B9-5B15-4C0C-9B4A-FA7DA058E908}" type="datetimeFigureOut">
               <a:rPr lang="en-US" smtClean="0"/>
-              <a:t>1/4/2018</a:t>
+              <a:t>1/11/2018</a:t>
             </a:fld>
             <a:endParaRPr lang="en-US"/>
           </a:p>
@@ -1014,7 +1014,7 @@
           <a:p>
             <a:fld id="{008BD8B9-5B15-4C0C-9B4A-FA7DA058E908}" type="datetimeFigureOut">
               <a:rPr lang="en-US" smtClean="0"/>
-              <a:t>1/4/2018</a:t>
+              <a:t>1/11/2018</a:t>
             </a:fld>
             <a:endParaRPr lang="en-US"/>
           </a:p>
@@ -1243,7 +1243,7 @@
           <a:p>
             <a:fld id="{008BD8B9-5B15-4C0C-9B4A-FA7DA058E908}" type="datetimeFigureOut">
               <a:rPr lang="en-US" smtClean="0"/>
-              <a:t>1/4/2018</a:t>
+              <a:t>1/11/2018</a:t>
             </a:fld>
             <a:endParaRPr lang="en-US"/>
           </a:p>
@@ -1607,7 +1607,7 @@
           <a:p>
             <a:fld id="{008BD8B9-5B15-4C0C-9B4A-FA7DA058E908}" type="datetimeFigureOut">
               <a:rPr lang="en-US" smtClean="0"/>
-              <a:t>1/4/2018</a:t>
+              <a:t>1/11/2018</a:t>
             </a:fld>
             <a:endParaRPr lang="en-US"/>
           </a:p>
@@ -1724,7 +1724,7 @@
           <a:p>
             <a:fld id="{008BD8B9-5B15-4C0C-9B4A-FA7DA058E908}" type="datetimeFigureOut">
               <a:rPr lang="en-US" smtClean="0"/>
-              <a:t>1/4/2018</a:t>
+              <a:t>1/11/2018</a:t>
             </a:fld>
             <a:endParaRPr lang="en-US"/>
           </a:p>
@@ -1819,7 +1819,7 @@
           <a:p>
             <a:fld id="{008BD8B9-5B15-4C0C-9B4A-FA7DA058E908}" type="datetimeFigureOut">
               <a:rPr lang="en-US" smtClean="0"/>
-              <a:t>1/4/2018</a:t>
+              <a:t>1/11/2018</a:t>
             </a:fld>
             <a:endParaRPr lang="en-US"/>
           </a:p>
@@ -2094,7 +2094,7 @@
           <a:p>
             <a:fld id="{008BD8B9-5B15-4C0C-9B4A-FA7DA058E908}" type="datetimeFigureOut">
               <a:rPr lang="en-US" smtClean="0"/>
-              <a:t>1/4/2018</a:t>
+              <a:t>1/11/2018</a:t>
             </a:fld>
             <a:endParaRPr lang="en-US"/>
           </a:p>
@@ -2346,7 +2346,7 @@
           <a:p>
             <a:fld id="{008BD8B9-5B15-4C0C-9B4A-FA7DA058E908}" type="datetimeFigureOut">
               <a:rPr lang="en-US" smtClean="0"/>
-              <a:t>1/4/2018</a:t>
+              <a:t>1/11/2018</a:t>
             </a:fld>
             <a:endParaRPr lang="en-US"/>
           </a:p>
@@ -2557,7 +2557,7 @@
           <a:p>
             <a:fld id="{008BD8B9-5B15-4C0C-9B4A-FA7DA058E908}" type="datetimeFigureOut">
               <a:rPr lang="en-US" smtClean="0"/>
-              <a:t>1/4/2018</a:t>
+              <a:t>1/11/2018</a:t>
             </a:fld>
             <a:endParaRPr lang="en-US"/>
           </a:p>
@@ -3085,7 +3085,7 @@
           <a:p>
             <a:r>
               <a:rPr lang="en-US" dirty="0"/>
-              <a:t>Lesson 5 – Lists and dictionaries</a:t>
+              <a:t>Lesson 5 – Lists and dictionaries (finish)</a:t>
             </a:r>
           </a:p>
           <a:p>
@@ -3690,7 +3690,7 @@
 </file>
 
 <file path=customXml/itemProps1.xml><?xml version="1.0" encoding="utf-8"?>
-<ds:datastoreItem xmlns:ds="http://schemas.openxmlformats.org/officeDocument/2006/customXml" ds:itemID="{627428BE-4818-4D31-8AAD-900FD13FFF33}">
+<ds:datastoreItem xmlns:ds="http://schemas.openxmlformats.org/officeDocument/2006/customXml" ds:itemID="{95DE5C01-0651-4C65-ACE3-19E0E9EA9A8C}">
   <ds:schemaRefs>
     <ds:schemaRef ds:uri="ESRI.ArcGIS.Mapping.OfficeIntegration.PowerPointInfo"/>
   </ds:schemaRefs>

</xml_diff>